<commit_message>
Quarks gluons jets and balck holes post
</commit_message>
<xml_diff>
--- a/assets/img/technical-level/rubric.pptx
+++ b/assets/img/technical-level/rubric.pptx
@@ -5,10 +5,11 @@
     <p:sldMasterId id="2147483648" r:id="rId1"/>
   </p:sldMasterIdLst>
   <p:notesMasterIdLst>
-    <p:notesMasterId r:id="rId3"/>
+    <p:notesMasterId r:id="rId4"/>
   </p:notesMasterIdLst>
   <p:sldIdLst>
     <p:sldId id="256" r:id="rId2"/>
+    <p:sldId id="257" r:id="rId3"/>
   </p:sldIdLst>
   <p:sldSz cx="12192000" cy="6858000"/>
   <p:notesSz cx="6858000" cy="9144000"/>
@@ -107,6 +108,11 @@
       </a:defRPr>
     </a:lvl9pPr>
   </p:defaultTextStyle>
+  <p:extLst>
+    <p:ext uri="{EFAFB233-063F-42B5-8137-9DF3F51BA10A}">
+      <p15:sldGuideLst xmlns:p15="http://schemas.microsoft.com/office/powerpoint/2012/main"/>
+    </p:ext>
+  </p:extLst>
 </p:presentation>
 </file>
 
@@ -4159,6 +4165,65 @@
     <p:extLst>
       <p:ext uri="{BB962C8B-B14F-4D97-AF65-F5344CB8AC3E}">
         <p14:creationId xmlns:p14="http://schemas.microsoft.com/office/powerpoint/2010/main" val="398262971"/>
+      </p:ext>
+    </p:extLst>
+  </p:cSld>
+  <p:clrMapOvr>
+    <a:masterClrMapping/>
+  </p:clrMapOvr>
+</p:sld>
+</file>
+
+<file path=ppt/slides/slide2.xml><?xml version="1.0" encoding="utf-8"?>
+<p:sld xmlns:a="http://schemas.openxmlformats.org/drawingml/2006/main" xmlns:r="http://schemas.openxmlformats.org/officeDocument/2006/relationships" xmlns:p="http://schemas.openxmlformats.org/presentationml/2006/main">
+  <p:cSld>
+    <p:spTree>
+      <p:nvGrpSpPr>
+        <p:cNvPr id="1" name=""/>
+        <p:cNvGrpSpPr/>
+        <p:nvPr/>
+      </p:nvGrpSpPr>
+      <p:grpSpPr>
+        <a:xfrm>
+          <a:off x="0" y="0"/>
+          <a:ext cx="0" cy="0"/>
+          <a:chOff x="0" y="0"/>
+          <a:chExt cx="0" cy="0"/>
+        </a:xfrm>
+      </p:grpSpPr>
+      <p:pic>
+        <p:nvPicPr>
+          <p:cNvPr id="5" name="Content Placeholder 4">
+            <a:extLst>
+              <a:ext uri="{FF2B5EF4-FFF2-40B4-BE49-F238E27FC236}">
+                <a16:creationId xmlns:a16="http://schemas.microsoft.com/office/drawing/2014/main" id="{F5A3C338-1B00-0241-A987-7B45F9DCB2E0}"/>
+              </a:ext>
+            </a:extLst>
+          </p:cNvPr>
+          <p:cNvPicPr>
+            <a:picLocks noGrp="1" noChangeAspect="1"/>
+          </p:cNvPicPr>
+          <p:nvPr>
+            <p:ph idx="1"/>
+          </p:nvPr>
+        </p:nvPicPr>
+        <p:blipFill>
+          <a:blip r:embed="rId2"/>
+          <a:stretch>
+            <a:fillRect/>
+          </a:stretch>
+        </p:blipFill>
+        <p:spPr>
+          <a:xfrm>
+            <a:off x="1168399" y="2013744"/>
+            <a:ext cx="5728347" cy="2310531"/>
+          </a:xfrm>
+        </p:spPr>
+      </p:pic>
+    </p:spTree>
+    <p:extLst>
+      <p:ext uri="{BB962C8B-B14F-4D97-AF65-F5344CB8AC3E}">
+        <p14:creationId xmlns:p14="http://schemas.microsoft.com/office/powerpoint/2010/main" val="4238156401"/>
       </p:ext>
     </p:extLst>
   </p:cSld>

</xml_diff>